<commit_message>
fix($q): improve custom components
</commit_message>
<xml_diff>
--- a/14 Custom components/Custom components.pptx
+++ b/14 Custom components/Custom components.pptx
@@ -3045,7 +3045,7 @@
             <a:fld id="{87731427-D242-475D-9180-8940013A50B8}" type="datetimeFigureOut">
               <a:rPr lang="en-GB" smtClean="0"/>
               <a:pPr algn="l"/>
-              <a:t>16/03/2017</a:t>
+              <a:t>09/06/2017</a:t>
             </a:fld>
             <a:endParaRPr lang="en-GB" dirty="0"/>
           </a:p>
@@ -3250,7 +3250,7 @@
             <a:fld id="{BA521D56-F1F4-41A0-82EB-989F4F6F400D}" type="datetimeFigureOut">
               <a:rPr lang="fr-FR" smtClean="0"/>
               <a:pPr/>
-              <a:t>16/03/2017</a:t>
+              <a:t>09/06/2017</a:t>
             </a:fld>
             <a:endParaRPr lang="fr-FR"/>
           </a:p>
@@ -12264,8 +12264,9 @@
             <a:pPr algn="ctr"/>
             <a:r>
               <a:rPr lang="fr-FR" sz="1400" dirty="0" smtClean="0"/>
-              <a:t>heroDetail.html</a:t>
-            </a:r>
+              <a:t>heroDetail.js</a:t>
+            </a:r>
+            <a:endParaRPr lang="fr-FR" sz="1400" dirty="0" smtClean="0"/>
           </a:p>
         </p:txBody>
       </p:sp>
@@ -12306,8 +12307,9 @@
             <a:pPr algn="ctr"/>
             <a:r>
               <a:rPr lang="fr-FR" sz="1400" dirty="0" smtClean="0"/>
-              <a:t>heroDetail.js</a:t>
-            </a:r>
+              <a:t>heroDetail.html</a:t>
+            </a:r>
+            <a:endParaRPr lang="fr-FR" sz="1400" dirty="0" smtClean="0"/>
           </a:p>
         </p:txBody>
       </p:sp>

</xml_diff>